<commit_message>
Lecture 7 presentation and code samples..
</commit_message>
<xml_diff>
--- a/presentation/Core Java - class 6.pptx
+++ b/presentation/Core Java - class 6.pptx
@@ -3472,14 +3472,10 @@
           <a:p>
             <a:r>
               <a:rPr lang="en-US" dirty="0" smtClean="0"/>
-              <a:t>Core Java – </a:t>
-            </a:r>
-            <a:r>
-              <a:rPr lang="en-US" smtClean="0"/>
-              <a:t>Class </a:t>
-            </a:r>
-            <a:r>
-              <a:rPr lang="en-US" smtClean="0"/>
+              <a:t>Core Java – Class </a:t>
+            </a:r>
+            <a:r>
+              <a:rPr lang="en-US" dirty="0" smtClean="0"/>
               <a:t>6</a:t>
             </a:r>
             <a:endParaRPr lang="en-US" dirty="0"/>

</xml_diff>